<commit_message>
petit à petit l'oiseau fait son nid
</commit_message>
<xml_diff>
--- a/Présentation-groupe-09-sc.pptx
+++ b/Présentation-groupe-09-sc.pptx
@@ -7,6 +7,10 @@
   <p:sldIdLst>
     <p:sldId id="256" r:id="rId2"/>
     <p:sldId id="257" r:id="rId3"/>
+    <p:sldId id="258" r:id="rId4"/>
+    <p:sldId id="259" r:id="rId5"/>
+    <p:sldId id="260" r:id="rId6"/>
+    <p:sldId id="261" r:id="rId7"/>
   </p:sldIdLst>
   <p:sldSz cx="9144000" cy="6858000" type="screen4x3"/>
   <p:notesSz cx="6858000" cy="9144000"/>
@@ -6068,10 +6072,15 @@
             <p:ph type="subTitle" idx="1"/>
           </p:nvPr>
         </p:nvSpPr>
-        <p:spPr/>
+        <p:spPr>
+          <a:xfrm>
+            <a:off x="1357290" y="3857628"/>
+            <a:ext cx="6400800" cy="1824046"/>
+          </a:xfrm>
+        </p:spPr>
         <p:txBody>
           <a:bodyPr>
-            <a:normAutofit/>
+            <a:normAutofit fontScale="92500" lnSpcReduction="10000"/>
           </a:bodyPr>
           <a:lstStyle/>
           <a:p>
@@ -6080,8 +6089,15 @@
           <a:p>
             <a:r>
               <a:rPr lang="fr-FR" dirty="0" smtClean="0"/>
-              <a:t>Groupe 09 Sciences Cognitives</a:t>
-            </a:r>
+              <a:t>Groupe 09 Sciences </a:t>
+            </a:r>
+            <a:r>
+              <a:rPr lang="fr-FR" dirty="0" smtClean="0"/>
+              <a:t>Cognitives</a:t>
+            </a:r>
+          </a:p>
+          <a:p>
+            <a:endParaRPr lang="fr-FR" dirty="0" smtClean="0"/>
           </a:p>
           <a:p>
             <a:r>
@@ -6140,6 +6156,13 @@
   <p:clrMapOvr>
     <a:masterClrMapping/>
   </p:clrMapOvr>
+  <p:timing>
+    <p:tnLst>
+      <p:par>
+        <p:cTn id="1" dur="indefinite" restart="never" nodeType="tmRoot"/>
+      </p:par>
+    </p:tnLst>
+  </p:timing>
 </p:sld>
 </file>
 
@@ -6206,7 +6229,11 @@
             </a:pPr>
             <a:r>
               <a:rPr lang="fr-FR" dirty="0" smtClean="0"/>
-              <a:t>Présentation du contexte et défis</a:t>
+              <a:t>Présentation du contexte et </a:t>
+            </a:r>
+            <a:r>
+              <a:rPr lang="fr-FR" dirty="0" smtClean="0"/>
+              <a:t>défis</a:t>
             </a:r>
           </a:p>
           <a:p>
@@ -6214,10 +6241,7 @@
               <a:buFont typeface="+mj-lt"/>
               <a:buAutoNum type="arabicPeriod"/>
             </a:pPr>
-            <a:r>
-              <a:rPr lang="fr-FR" dirty="0" smtClean="0"/>
-              <a:t>Solution proposée</a:t>
-            </a:r>
+            <a:endParaRPr lang="fr-FR" dirty="0" smtClean="0"/>
           </a:p>
           <a:p>
             <a:pPr marL="514350" indent="-514350">
@@ -6226,8 +6250,32 @@
             </a:pPr>
             <a:r>
               <a:rPr lang="fr-FR" dirty="0" smtClean="0"/>
+              <a:t>Solutions proposées</a:t>
+            </a:r>
+          </a:p>
+          <a:p>
+            <a:pPr marL="514350" indent="-514350">
+              <a:buFont typeface="+mj-lt"/>
+              <a:buAutoNum type="arabicPeriod"/>
+            </a:pPr>
+            <a:endParaRPr lang="fr-FR" dirty="0" smtClean="0"/>
+          </a:p>
+          <a:p>
+            <a:pPr marL="514350" indent="-514350">
+              <a:buFont typeface="+mj-lt"/>
+              <a:buAutoNum type="arabicPeriod"/>
+            </a:pPr>
+            <a:r>
+              <a:rPr lang="fr-FR" dirty="0" smtClean="0"/>
               <a:t>Démonstration</a:t>
             </a:r>
+          </a:p>
+          <a:p>
+            <a:pPr marL="514350" indent="-514350">
+              <a:buFont typeface="+mj-lt"/>
+              <a:buAutoNum type="arabicPeriod"/>
+            </a:pPr>
+            <a:endParaRPr lang="fr-FR" dirty="0" smtClean="0"/>
           </a:p>
           <a:p>
             <a:pPr marL="514350" indent="-514350">
@@ -6259,6 +6307,388 @@
   <p:clrMapOvr>
     <a:masterClrMapping/>
   </p:clrMapOvr>
+  <p:timing>
+    <p:tnLst>
+      <p:par>
+        <p:cTn id="1" dur="indefinite" restart="never" nodeType="tmRoot"/>
+      </p:par>
+    </p:tnLst>
+  </p:timing>
+</p:sld>
+</file>
+
+<file path=ppt/slides/slide3.xml><?xml version="1.0" encoding="utf-8"?>
+<p:sld xmlns:a="http://schemas.openxmlformats.org/drawingml/2006/main" xmlns:r="http://schemas.openxmlformats.org/officeDocument/2006/relationships" xmlns:p="http://schemas.openxmlformats.org/presentationml/2006/main">
+  <p:cSld>
+    <p:spTree>
+      <p:nvGrpSpPr>
+        <p:cNvPr id="1" name=""/>
+        <p:cNvGrpSpPr/>
+        <p:nvPr/>
+      </p:nvGrpSpPr>
+      <p:grpSpPr>
+        <a:xfrm>
+          <a:off x="0" y="0"/>
+          <a:ext cx="0" cy="0"/>
+          <a:chOff x="0" y="0"/>
+          <a:chExt cx="0" cy="0"/>
+        </a:xfrm>
+      </p:grpSpPr>
+      <p:sp>
+        <p:nvSpPr>
+          <p:cNvPr id="2" name="Titre 1"/>
+          <p:cNvSpPr>
+            <a:spLocks noGrp="1"/>
+          </p:cNvSpPr>
+          <p:nvPr>
+            <p:ph type="title"/>
+          </p:nvPr>
+        </p:nvSpPr>
+        <p:spPr/>
+        <p:txBody>
+          <a:bodyPr/>
+          <a:lstStyle/>
+          <a:p>
+            <a:r>
+              <a:rPr lang="fr-FR" dirty="0" smtClean="0"/>
+              <a:t>Présentation du contexte et des défis</a:t>
+            </a:r>
+            <a:endParaRPr lang="fr-FR" dirty="0"/>
+          </a:p>
+        </p:txBody>
+      </p:sp>
+      <p:sp>
+        <p:nvSpPr>
+          <p:cNvPr id="3" name="Espace réservé du contenu 2"/>
+          <p:cNvSpPr>
+            <a:spLocks noGrp="1"/>
+          </p:cNvSpPr>
+          <p:nvPr>
+            <p:ph sz="quarter" idx="1"/>
+          </p:nvPr>
+        </p:nvSpPr>
+        <p:spPr/>
+        <p:txBody>
+          <a:bodyPr/>
+          <a:lstStyle/>
+          <a:p>
+            <a:endParaRPr lang="fr-FR" dirty="0" smtClean="0"/>
+          </a:p>
+          <a:p>
+            <a:r>
+              <a:rPr lang="fr-FR" dirty="0" smtClean="0"/>
+              <a:t>Recherche et recommandation de séries télévisées</a:t>
+            </a:r>
+          </a:p>
+          <a:p>
+            <a:endParaRPr lang="fr-FR" dirty="0" smtClean="0"/>
+          </a:p>
+          <a:p>
+            <a:r>
+              <a:rPr lang="fr-FR" dirty="0" smtClean="0"/>
+              <a:t>Défis : </a:t>
+            </a:r>
+          </a:p>
+          <a:p>
+            <a:pPr lvl="1"/>
+            <a:r>
+              <a:rPr lang="fr-FR" dirty="0" smtClean="0"/>
+              <a:t>Niveau 1 : </a:t>
+            </a:r>
+            <a:r>
+              <a:rPr lang="fr-FR" dirty="0" smtClean="0"/>
+              <a:t>✔</a:t>
+            </a:r>
+            <a:endParaRPr lang="fr-FR" dirty="0" smtClean="0"/>
+          </a:p>
+          <a:p>
+            <a:pPr lvl="1"/>
+            <a:r>
+              <a:rPr lang="fr-FR" dirty="0" smtClean="0"/>
+              <a:t>Niveau 2 : </a:t>
+            </a:r>
+            <a:r>
+              <a:rPr lang="fr-FR" dirty="0" smtClean="0"/>
+              <a:t>✔</a:t>
+            </a:r>
+            <a:endParaRPr lang="fr-FR" dirty="0" smtClean="0"/>
+          </a:p>
+          <a:p>
+            <a:pPr lvl="1"/>
+            <a:r>
+              <a:rPr lang="fr-FR" dirty="0" smtClean="0"/>
+              <a:t>Niveau 3 : </a:t>
+            </a:r>
+            <a:r>
+              <a:rPr lang="fr-FR" b="1" dirty="0" smtClean="0"/>
+              <a:t>~</a:t>
+            </a:r>
+            <a:endParaRPr lang="fr-FR" dirty="0"/>
+          </a:p>
+        </p:txBody>
+      </p:sp>
+    </p:spTree>
+  </p:cSld>
+  <p:clrMapOvr>
+    <a:masterClrMapping/>
+  </p:clrMapOvr>
+  <p:timing>
+    <p:tnLst>
+      <p:par>
+        <p:cTn id="1" dur="indefinite" restart="never" nodeType="tmRoot"/>
+      </p:par>
+    </p:tnLst>
+  </p:timing>
+</p:sld>
+</file>
+
+<file path=ppt/slides/slide4.xml><?xml version="1.0" encoding="utf-8"?>
+<p:sld xmlns:a="http://schemas.openxmlformats.org/drawingml/2006/main" xmlns:r="http://schemas.openxmlformats.org/officeDocument/2006/relationships" xmlns:p="http://schemas.openxmlformats.org/presentationml/2006/main">
+  <p:cSld>
+    <p:spTree>
+      <p:nvGrpSpPr>
+        <p:cNvPr id="1" name=""/>
+        <p:cNvGrpSpPr/>
+        <p:nvPr/>
+      </p:nvGrpSpPr>
+      <p:grpSpPr>
+        <a:xfrm>
+          <a:off x="0" y="0"/>
+          <a:ext cx="0" cy="0"/>
+          <a:chOff x="0" y="0"/>
+          <a:chExt cx="0" cy="0"/>
+        </a:xfrm>
+      </p:grpSpPr>
+      <p:sp>
+        <p:nvSpPr>
+          <p:cNvPr id="2" name="Titre 1"/>
+          <p:cNvSpPr>
+            <a:spLocks noGrp="1"/>
+          </p:cNvSpPr>
+          <p:nvPr>
+            <p:ph type="title"/>
+          </p:nvPr>
+        </p:nvSpPr>
+        <p:spPr/>
+        <p:txBody>
+          <a:bodyPr/>
+          <a:lstStyle/>
+          <a:p>
+            <a:r>
+              <a:rPr lang="fr-FR" dirty="0" smtClean="0"/>
+              <a:t>Solutions proposées</a:t>
+            </a:r>
+            <a:endParaRPr lang="fr-FR" dirty="0"/>
+          </a:p>
+        </p:txBody>
+      </p:sp>
+      <p:sp>
+        <p:nvSpPr>
+          <p:cNvPr id="3" name="Espace réservé du contenu 2"/>
+          <p:cNvSpPr>
+            <a:spLocks noGrp="1"/>
+          </p:cNvSpPr>
+          <p:nvPr>
+            <p:ph sz="quarter" idx="1"/>
+          </p:nvPr>
+        </p:nvSpPr>
+        <p:spPr/>
+        <p:txBody>
+          <a:bodyPr/>
+          <a:lstStyle/>
+          <a:p>
+            <a:endParaRPr lang="fr-FR"/>
+          </a:p>
+        </p:txBody>
+      </p:sp>
+    </p:spTree>
+  </p:cSld>
+  <p:clrMapOvr>
+    <a:masterClrMapping/>
+  </p:clrMapOvr>
+  <p:timing>
+    <p:tnLst>
+      <p:par>
+        <p:cTn id="1" dur="indefinite" restart="never" nodeType="tmRoot"/>
+      </p:par>
+    </p:tnLst>
+  </p:timing>
+</p:sld>
+</file>
+
+<file path=ppt/slides/slide5.xml><?xml version="1.0" encoding="utf-8"?>
+<p:sld xmlns:a="http://schemas.openxmlformats.org/drawingml/2006/main" xmlns:r="http://schemas.openxmlformats.org/officeDocument/2006/relationships" xmlns:p="http://schemas.openxmlformats.org/presentationml/2006/main">
+  <p:cSld>
+    <p:spTree>
+      <p:nvGrpSpPr>
+        <p:cNvPr id="1" name=""/>
+        <p:cNvGrpSpPr/>
+        <p:nvPr/>
+      </p:nvGrpSpPr>
+      <p:grpSpPr>
+        <a:xfrm>
+          <a:off x="0" y="0"/>
+          <a:ext cx="0" cy="0"/>
+          <a:chOff x="0" y="0"/>
+          <a:chExt cx="0" cy="0"/>
+        </a:xfrm>
+      </p:grpSpPr>
+      <p:sp>
+        <p:nvSpPr>
+          <p:cNvPr id="2" name="Titre 1"/>
+          <p:cNvSpPr>
+            <a:spLocks noGrp="1"/>
+          </p:cNvSpPr>
+          <p:nvPr>
+            <p:ph type="title"/>
+          </p:nvPr>
+        </p:nvSpPr>
+        <p:spPr/>
+        <p:txBody>
+          <a:bodyPr/>
+          <a:lstStyle/>
+          <a:p>
+            <a:r>
+              <a:rPr lang="fr-FR" dirty="0" smtClean="0"/>
+              <a:t>Démonstration</a:t>
+            </a:r>
+            <a:endParaRPr lang="fr-FR" dirty="0"/>
+          </a:p>
+        </p:txBody>
+      </p:sp>
+      <p:sp>
+        <p:nvSpPr>
+          <p:cNvPr id="3" name="Espace réservé du contenu 2"/>
+          <p:cNvSpPr>
+            <a:spLocks noGrp="1"/>
+          </p:cNvSpPr>
+          <p:nvPr>
+            <p:ph sz="quarter" idx="1"/>
+          </p:nvPr>
+        </p:nvSpPr>
+        <p:spPr/>
+        <p:txBody>
+          <a:bodyPr/>
+          <a:lstStyle/>
+          <a:p>
+            <a:endParaRPr lang="fr-FR"/>
+          </a:p>
+        </p:txBody>
+      </p:sp>
+    </p:spTree>
+  </p:cSld>
+  <p:clrMapOvr>
+    <a:masterClrMapping/>
+  </p:clrMapOvr>
+  <p:timing>
+    <p:tnLst>
+      <p:par>
+        <p:cTn id="1" dur="indefinite" restart="never" nodeType="tmRoot"/>
+      </p:par>
+    </p:tnLst>
+  </p:timing>
+</p:sld>
+</file>
+
+<file path=ppt/slides/slide6.xml><?xml version="1.0" encoding="utf-8"?>
+<p:sld xmlns:a="http://schemas.openxmlformats.org/drawingml/2006/main" xmlns:r="http://schemas.openxmlformats.org/officeDocument/2006/relationships" xmlns:p="http://schemas.openxmlformats.org/presentationml/2006/main">
+  <p:cSld>
+    <p:spTree>
+      <p:nvGrpSpPr>
+        <p:cNvPr id="1" name=""/>
+        <p:cNvGrpSpPr/>
+        <p:nvPr/>
+      </p:nvGrpSpPr>
+      <p:grpSpPr>
+        <a:xfrm>
+          <a:off x="0" y="0"/>
+          <a:ext cx="0" cy="0"/>
+          <a:chOff x="0" y="0"/>
+          <a:chExt cx="0" cy="0"/>
+        </a:xfrm>
+      </p:grpSpPr>
+      <p:sp>
+        <p:nvSpPr>
+          <p:cNvPr id="2" name="Titre 1"/>
+          <p:cNvSpPr>
+            <a:spLocks noGrp="1"/>
+          </p:cNvSpPr>
+          <p:nvPr>
+            <p:ph type="title"/>
+          </p:nvPr>
+        </p:nvSpPr>
+        <p:spPr/>
+        <p:txBody>
+          <a:bodyPr/>
+          <a:lstStyle/>
+          <a:p>
+            <a:r>
+              <a:rPr lang="fr-FR" dirty="0" smtClean="0"/>
+              <a:t>Rétrospective</a:t>
+            </a:r>
+            <a:endParaRPr lang="fr-FR" dirty="0"/>
+          </a:p>
+        </p:txBody>
+      </p:sp>
+      <p:sp>
+        <p:nvSpPr>
+          <p:cNvPr id="3" name="Espace réservé du contenu 2"/>
+          <p:cNvSpPr>
+            <a:spLocks noGrp="1"/>
+          </p:cNvSpPr>
+          <p:nvPr>
+            <p:ph sz="quarter" idx="1"/>
+          </p:nvPr>
+        </p:nvSpPr>
+        <p:spPr/>
+        <p:txBody>
+          <a:bodyPr/>
+          <a:lstStyle/>
+          <a:p>
+            <a:endParaRPr lang="fr-FR" dirty="0" smtClean="0"/>
+          </a:p>
+          <a:p>
+            <a:endParaRPr lang="fr-FR" dirty="0" smtClean="0"/>
+          </a:p>
+          <a:p>
+            <a:r>
+              <a:rPr lang="fr-FR" dirty="0" smtClean="0"/>
+              <a:t>Recommandation sommaire</a:t>
+            </a:r>
+          </a:p>
+          <a:p>
+            <a:r>
+              <a:rPr lang="fr-FR" dirty="0" smtClean="0"/>
+              <a:t>Recherche améliorable</a:t>
+            </a:r>
+          </a:p>
+          <a:p>
+            <a:r>
+              <a:rPr lang="fr-FR" dirty="0" smtClean="0"/>
+              <a:t>Affichage des séries</a:t>
+            </a:r>
+          </a:p>
+          <a:p>
+            <a:r>
+              <a:rPr lang="fr-FR" dirty="0" smtClean="0"/>
+              <a:t>Gestion de projet</a:t>
+            </a:r>
+            <a:endParaRPr lang="fr-FR" dirty="0"/>
+          </a:p>
+        </p:txBody>
+      </p:sp>
+    </p:spTree>
+  </p:cSld>
+  <p:clrMapOvr>
+    <a:masterClrMapping/>
+  </p:clrMapOvr>
+  <p:timing>
+    <p:tnLst>
+      <p:par>
+        <p:cTn id="1" dur="indefinite" restart="never" nodeType="tmRoot"/>
+      </p:par>
+    </p:tnLst>
+  </p:timing>
 </p:sld>
 </file>
 

</xml_diff>

<commit_message>
on avait oublié le menu déroulant pour series.html
register.html était vide
</commit_message>
<xml_diff>
--- a/Présentation-groupe-09-sc.pptx
+++ b/Présentation-groupe-09-sc.pptx
@@ -6089,11 +6089,7 @@
           <a:p>
             <a:r>
               <a:rPr lang="fr-FR" dirty="0" smtClean="0"/>
-              <a:t>Groupe 09 Sciences </a:t>
-            </a:r>
-            <a:r>
-              <a:rPr lang="fr-FR" dirty="0" smtClean="0"/>
-              <a:t>Cognitives</a:t>
+              <a:t>Groupe 09 Sciences Cognitives</a:t>
             </a:r>
           </a:p>
           <a:p>
@@ -6229,11 +6225,7 @@
             </a:pPr>
             <a:r>
               <a:rPr lang="fr-FR" dirty="0" smtClean="0"/>
-              <a:t>Présentation du contexte et </a:t>
-            </a:r>
-            <a:r>
-              <a:rPr lang="fr-FR" dirty="0" smtClean="0"/>
-              <a:t>défis</a:t>
+              <a:t>Présentation du contexte et défis</a:t>
             </a:r>
           </a:p>
           <a:p>
@@ -6393,25 +6385,15 @@
             <a:pPr lvl="1"/>
             <a:r>
               <a:rPr lang="fr-FR" dirty="0" smtClean="0"/>
-              <a:t>Niveau 1 : </a:t>
-            </a:r>
+              <a:t>Niveau 1 : ✔</a:t>
+            </a:r>
+          </a:p>
+          <a:p>
+            <a:pPr lvl="1"/>
             <a:r>
               <a:rPr lang="fr-FR" dirty="0" smtClean="0"/>
-              <a:t>✔</a:t>
-            </a:r>
-            <a:endParaRPr lang="fr-FR" dirty="0" smtClean="0"/>
-          </a:p>
-          <a:p>
-            <a:pPr lvl="1"/>
-            <a:r>
-              <a:rPr lang="fr-FR" dirty="0" smtClean="0"/>
-              <a:t>Niveau 2 : </a:t>
-            </a:r>
-            <a:r>
-              <a:rPr lang="fr-FR" dirty="0" smtClean="0"/>
-              <a:t>✔</a:t>
-            </a:r>
-            <a:endParaRPr lang="fr-FR" dirty="0" smtClean="0"/>
+              <a:t>Niveau 2 : ✔</a:t>
+            </a:r>
           </a:p>
           <a:p>
             <a:pPr lvl="1"/>

</xml_diff>